<commit_message>
Resolve conflict from pull
</commit_message>
<xml_diff>
--- a/write_up/poster/poster_lucamuscat.pptx
+++ b/write_up/poster/poster_lucamuscat.pptx
@@ -3019,7 +3019,7 @@
           <a:p>
             <a:fld id="{70F0E767-06F5-1743-8250-09BED16D1E0E}" type="datetimeFigureOut">
               <a:rPr lang="en-US" smtClean="0"/>
-              <a:t>6/6/2022</a:t>
+              <a:t>6/9/2022</a:t>
             </a:fld>
             <a:endParaRPr lang="en-US"/>
           </a:p>
@@ -3196,7 +3196,7 @@
           <a:p>
             <a:fld id="{01FC99CA-AF55-2547-B865-ACD414BD3D5B}" type="datetimeFigureOut">
               <a:rPr lang="en-US" smtClean="0"/>
-              <a:t>6/6/2022</a:t>
+              <a:t>6/9/2022</a:t>
             </a:fld>
             <a:endParaRPr lang="en-US"/>
           </a:p>
@@ -3678,7 +3678,7 @@
           <a:p>
             <a:fld id="{0D95E40B-6DE2-BC44-9D41-DAE6D07500F7}" type="datetimeFigureOut">
               <a:rPr lang="en-US" smtClean="0"/>
-              <a:t>6/6/2022</a:t>
+              <a:t>6/9/2022</a:t>
             </a:fld>
             <a:endParaRPr lang="en-US"/>
           </a:p>
@@ -3848,7 +3848,7 @@
           <a:p>
             <a:fld id="{0D95E40B-6DE2-BC44-9D41-DAE6D07500F7}" type="datetimeFigureOut">
               <a:rPr lang="en-US" smtClean="0"/>
-              <a:t>6/6/2022</a:t>
+              <a:t>6/9/2022</a:t>
             </a:fld>
             <a:endParaRPr lang="en-US"/>
           </a:p>
@@ -4028,7 +4028,7 @@
           <a:p>
             <a:fld id="{0D95E40B-6DE2-BC44-9D41-DAE6D07500F7}" type="datetimeFigureOut">
               <a:rPr lang="en-US" smtClean="0"/>
-              <a:t>6/6/2022</a:t>
+              <a:t>6/9/2022</a:t>
             </a:fld>
             <a:endParaRPr lang="en-US"/>
           </a:p>
@@ -4198,7 +4198,7 @@
           <a:p>
             <a:fld id="{0D95E40B-6DE2-BC44-9D41-DAE6D07500F7}" type="datetimeFigureOut">
               <a:rPr lang="en-US" smtClean="0"/>
-              <a:t>6/6/2022</a:t>
+              <a:t>6/9/2022</a:t>
             </a:fld>
             <a:endParaRPr lang="en-US"/>
           </a:p>
@@ -4442,7 +4442,7 @@
           <a:p>
             <a:fld id="{0D95E40B-6DE2-BC44-9D41-DAE6D07500F7}" type="datetimeFigureOut">
               <a:rPr lang="en-US" smtClean="0"/>
-              <a:t>6/6/2022</a:t>
+              <a:t>6/9/2022</a:t>
             </a:fld>
             <a:endParaRPr lang="en-US"/>
           </a:p>
@@ -4674,7 +4674,7 @@
           <a:p>
             <a:fld id="{0D95E40B-6DE2-BC44-9D41-DAE6D07500F7}" type="datetimeFigureOut">
               <a:rPr lang="en-US" smtClean="0"/>
-              <a:t>6/6/2022</a:t>
+              <a:t>6/9/2022</a:t>
             </a:fld>
             <a:endParaRPr lang="en-US"/>
           </a:p>
@@ -5041,7 +5041,7 @@
           <a:p>
             <a:fld id="{0D95E40B-6DE2-BC44-9D41-DAE6D07500F7}" type="datetimeFigureOut">
               <a:rPr lang="en-US" smtClean="0"/>
-              <a:t>6/6/2022</a:t>
+              <a:t>6/9/2022</a:t>
             </a:fld>
             <a:endParaRPr lang="en-US"/>
           </a:p>
@@ -5159,7 +5159,7 @@
           <a:p>
             <a:fld id="{0D95E40B-6DE2-BC44-9D41-DAE6D07500F7}" type="datetimeFigureOut">
               <a:rPr lang="en-US" smtClean="0"/>
-              <a:t>6/6/2022</a:t>
+              <a:t>6/9/2022</a:t>
             </a:fld>
             <a:endParaRPr lang="en-US"/>
           </a:p>
@@ -5254,7 +5254,7 @@
           <a:p>
             <a:fld id="{0D95E40B-6DE2-BC44-9D41-DAE6D07500F7}" type="datetimeFigureOut">
               <a:rPr lang="en-US" smtClean="0"/>
-              <a:t>6/6/2022</a:t>
+              <a:t>6/9/2022</a:t>
             </a:fld>
             <a:endParaRPr lang="en-US"/>
           </a:p>
@@ -5531,7 +5531,7 @@
           <a:p>
             <a:fld id="{0D95E40B-6DE2-BC44-9D41-DAE6D07500F7}" type="datetimeFigureOut">
               <a:rPr lang="en-US" smtClean="0"/>
-              <a:t>6/6/2022</a:t>
+              <a:t>6/9/2022</a:t>
             </a:fld>
             <a:endParaRPr lang="en-US"/>
           </a:p>
@@ -5788,7 +5788,7 @@
           <a:p>
             <a:fld id="{0D95E40B-6DE2-BC44-9D41-DAE6D07500F7}" type="datetimeFigureOut">
               <a:rPr lang="en-US" smtClean="0"/>
-              <a:t>6/6/2022</a:t>
+              <a:t>6/9/2022</a:t>
             </a:fld>
             <a:endParaRPr lang="en-US"/>
           </a:p>
@@ -6001,7 +6001,7 @@
           <a:p>
             <a:fld id="{0D95E40B-6DE2-BC44-9D41-DAE6D07500F7}" type="datetimeFigureOut">
               <a:rPr lang="en-US" smtClean="0"/>
-              <a:t>6/6/2022</a:t>
+              <a:t>6/9/2022</a:t>
             </a:fld>
             <a:endParaRPr lang="en-US"/>
           </a:p>
@@ -8104,7 +8104,7 @@
         <p:spPr>
           <a:xfrm>
             <a:off x="7998686" y="5457980"/>
-            <a:ext cx="6444274" cy="4696492"/>
+            <a:ext cx="6444273" cy="4696492"/>
           </a:xfrm>
           <a:prstGeom prst="rect">
             <a:avLst/>

</xml_diff>